<commit_message>
fix titles in lecture 19
</commit_message>
<xml_diff>
--- a/classes/stats2015/Lecture19.pptx
+++ b/classes/stats2015/Lecture19.pptx
@@ -264,7 +264,7 @@
             <a:fld id="{04CF0F85-68D0-4C9E-9C3D-C3BA0419FD92}" type="datetimeFigureOut">
               <a:rPr lang="en-US" smtClean="0"/>
               <a:pPr/>
-              <a:t>4/10/2015</a:t>
+              <a:t>4/12/2015</a:t>
             </a:fld>
             <a:endParaRPr lang="en-US"/>
           </a:p>
@@ -4898,7 +4898,7 @@
             <a:fld id="{1D8BD707-D9CF-40AE-B4C6-C98DA3205C09}" type="datetimeFigureOut">
               <a:rPr lang="en-US" smtClean="0"/>
               <a:pPr/>
-              <a:t>4/10/2015</a:t>
+              <a:t>4/12/2015</a:t>
             </a:fld>
             <a:endParaRPr lang="en-US"/>
           </a:p>
@@ -5065,7 +5065,7 @@
             <a:fld id="{1D8BD707-D9CF-40AE-B4C6-C98DA3205C09}" type="datetimeFigureOut">
               <a:rPr lang="en-US" smtClean="0"/>
               <a:pPr/>
-              <a:t>4/10/2015</a:t>
+              <a:t>4/12/2015</a:t>
             </a:fld>
             <a:endParaRPr lang="en-US"/>
           </a:p>
@@ -5242,7 +5242,7 @@
             <a:fld id="{1D8BD707-D9CF-40AE-B4C6-C98DA3205C09}" type="datetimeFigureOut">
               <a:rPr lang="en-US" smtClean="0"/>
               <a:pPr/>
-              <a:t>4/10/2015</a:t>
+              <a:t>4/12/2015</a:t>
             </a:fld>
             <a:endParaRPr lang="en-US"/>
           </a:p>
@@ -5409,7 +5409,7 @@
             <a:fld id="{1D8BD707-D9CF-40AE-B4C6-C98DA3205C09}" type="datetimeFigureOut">
               <a:rPr lang="en-US" smtClean="0"/>
               <a:pPr/>
-              <a:t>4/10/2015</a:t>
+              <a:t>4/12/2015</a:t>
             </a:fld>
             <a:endParaRPr lang="en-US"/>
           </a:p>
@@ -5652,7 +5652,7 @@
             <a:fld id="{1D8BD707-D9CF-40AE-B4C6-C98DA3205C09}" type="datetimeFigureOut">
               <a:rPr lang="en-US" smtClean="0"/>
               <a:pPr/>
-              <a:t>4/10/2015</a:t>
+              <a:t>4/12/2015</a:t>
             </a:fld>
             <a:endParaRPr lang="en-US"/>
           </a:p>
@@ -5937,7 +5937,7 @@
             <a:fld id="{1D8BD707-D9CF-40AE-B4C6-C98DA3205C09}" type="datetimeFigureOut">
               <a:rPr lang="en-US" smtClean="0"/>
               <a:pPr/>
-              <a:t>4/10/2015</a:t>
+              <a:t>4/12/2015</a:t>
             </a:fld>
             <a:endParaRPr lang="en-US"/>
           </a:p>
@@ -6356,7 +6356,7 @@
             <a:fld id="{1D8BD707-D9CF-40AE-B4C6-C98DA3205C09}" type="datetimeFigureOut">
               <a:rPr lang="en-US" smtClean="0"/>
               <a:pPr/>
-              <a:t>4/10/2015</a:t>
+              <a:t>4/12/2015</a:t>
             </a:fld>
             <a:endParaRPr lang="en-US"/>
           </a:p>
@@ -6471,7 +6471,7 @@
             <a:fld id="{1D8BD707-D9CF-40AE-B4C6-C98DA3205C09}" type="datetimeFigureOut">
               <a:rPr lang="en-US" smtClean="0"/>
               <a:pPr/>
-              <a:t>4/10/2015</a:t>
+              <a:t>4/12/2015</a:t>
             </a:fld>
             <a:endParaRPr lang="en-US"/>
           </a:p>
@@ -6563,7 +6563,7 @@
             <a:fld id="{1D8BD707-D9CF-40AE-B4C6-C98DA3205C09}" type="datetimeFigureOut">
               <a:rPr lang="en-US" smtClean="0"/>
               <a:pPr/>
-              <a:t>4/10/2015</a:t>
+              <a:t>4/12/2015</a:t>
             </a:fld>
             <a:endParaRPr lang="en-US"/>
           </a:p>
@@ -6837,7 +6837,7 @@
             <a:fld id="{1D8BD707-D9CF-40AE-B4C6-C98DA3205C09}" type="datetimeFigureOut">
               <a:rPr lang="en-US" smtClean="0"/>
               <a:pPr/>
-              <a:t>4/10/2015</a:t>
+              <a:t>4/12/2015</a:t>
             </a:fld>
             <a:endParaRPr lang="en-US"/>
           </a:p>
@@ -7087,7 +7087,7 @@
             <a:fld id="{1D8BD707-D9CF-40AE-B4C6-C98DA3205C09}" type="datetimeFigureOut">
               <a:rPr lang="en-US" smtClean="0"/>
               <a:pPr/>
-              <a:t>4/10/2015</a:t>
+              <a:t>4/12/2015</a:t>
             </a:fld>
             <a:endParaRPr lang="en-US"/>
           </a:p>
@@ -7297,7 +7297,7 @@
             <a:fld id="{1D8BD707-D9CF-40AE-B4C6-C98DA3205C09}" type="datetimeFigureOut">
               <a:rPr lang="en-US" smtClean="0"/>
               <a:pPr/>
-              <a:t>4/10/2015</a:t>
+              <a:t>4/12/2015</a:t>
             </a:fld>
             <a:endParaRPr lang="en-US"/>
           </a:p>
@@ -7698,39 +7698,22 @@
           <a:p>
             <a:r>
               <a:rPr lang="en-US" dirty="0" smtClean="0"/>
-              <a:t>	</a:t>
-            </a:r>
-            <a:r>
-              <a:rPr lang="en-US" dirty="0" smtClean="0"/>
-              <a:t>Final – May 6 – 8:30 am </a:t>
-            </a:r>
-          </a:p>
-          <a:p>
-            <a:r>
-              <a:rPr lang="en-US" dirty="0" smtClean="0"/>
-              <a:t>	</a:t>
-            </a:r>
-            <a:r>
-              <a:rPr lang="en-US" dirty="0" smtClean="0"/>
-              <a:t>(we will delay half an hour from the suggested 8:00 am time)</a:t>
-            </a:r>
-            <a:r>
-              <a:rPr lang="en-US" dirty="0" smtClean="0"/>
-              <a:t>	</a:t>
-            </a:r>
+              <a:t>	Final – May 6 – 8:30 am </a:t>
+            </a:r>
+          </a:p>
+          <a:p>
+            <a:r>
+              <a:rPr lang="en-US" dirty="0" smtClean="0"/>
+              <a:t>	(we will delay half an hour from the suggested 8:00 am time)	</a:t>
+            </a:r>
+          </a:p>
+          <a:p>
             <a:endParaRPr lang="en-US" dirty="0" smtClean="0"/>
           </a:p>
           <a:p>
-            <a:endParaRPr lang="en-US" dirty="0" smtClean="0"/>
-          </a:p>
-          <a:p>
-            <a:r>
-              <a:rPr lang="en-US" dirty="0" smtClean="0"/>
-              <a:t>	You will have the study guide by Apri</a:t>
-            </a:r>
-            <a:r>
-              <a:rPr lang="en-US" dirty="0" smtClean="0"/>
-              <a:t>l 27</a:t>
+            <a:r>
+              <a:rPr lang="en-US" dirty="0" smtClean="0"/>
+              <a:t>	You will have the study guide by April 27</a:t>
             </a:r>
             <a:r>
               <a:rPr lang="en-US" baseline="30000" dirty="0" smtClean="0"/>
@@ -8989,15 +8972,7 @@
           <a:p>
             <a:r>
               <a:rPr lang="en-US" dirty="0" smtClean="0"/>
-              <a:t>We look at one approach that rotates the data onto new </a:t>
-            </a:r>
-            <a:r>
-              <a:rPr lang="en-US" dirty="0" smtClean="0"/>
-              <a:t>coordinates </a:t>
-            </a:r>
-            <a:r>
-              <a:rPr lang="en-US" dirty="0" smtClean="0"/>
-              <a:t>that</a:t>
+              <a:t>We look at one approach that rotates the data onto new coordinates that</a:t>
             </a:r>
           </a:p>
           <a:p>
@@ -9045,14 +9020,14 @@
       </p:grpSpPr>
       <p:sp>
         <p:nvSpPr>
-          <p:cNvPr id="6" name="TextBox 5"/>
+          <p:cNvPr id="4" name="TextBox 3"/>
           <p:cNvSpPr txBox="1"/>
           <p:nvPr/>
         </p:nvSpPr>
         <p:spPr>
           <a:xfrm>
-            <a:off x="304800" y="304800"/>
-            <a:ext cx="6026009" cy="1200329"/>
+            <a:off x="152400" y="228600"/>
+            <a:ext cx="6026009" cy="1477328"/>
           </a:xfrm>
           <a:prstGeom prst="rect">
             <a:avLst/>
@@ -9067,6 +9042,12 @@
           <a:p>
             <a:r>
               <a:rPr lang="en-US" dirty="0" smtClean="0"/>
+              <a:t>Testing for random effects in linear models</a:t>
+            </a:r>
+          </a:p>
+          <a:p>
+            <a:r>
+              <a:rPr lang="en-US" dirty="0" smtClean="0"/>
               <a:t>Correlated variables in linear models</a:t>
             </a:r>
           </a:p>
@@ -9093,13 +9074,13 @@
       </p:sp>
       <p:cxnSp>
         <p:nvCxnSpPr>
-          <p:cNvPr id="7" name="Straight Arrow Connector 6"/>
+          <p:cNvPr id="5" name="Straight Arrow Connector 4"/>
           <p:cNvCxnSpPr/>
           <p:nvPr/>
         </p:nvCxnSpPr>
         <p:spPr>
           <a:xfrm rot="10800000">
-            <a:off x="1981200" y="760411"/>
+            <a:off x="1828800" y="989012"/>
             <a:ext cx="533400" cy="1588"/>
           </a:xfrm>
           <a:prstGeom prst="straightConnector1">
@@ -16465,14 +16446,14 @@
       </p:grpSpPr>
       <p:sp>
         <p:nvSpPr>
-          <p:cNvPr id="4" name="TextBox 3"/>
+          <p:cNvPr id="6" name="TextBox 5"/>
           <p:cNvSpPr txBox="1"/>
           <p:nvPr/>
         </p:nvSpPr>
         <p:spPr>
           <a:xfrm>
-            <a:off x="304800" y="304800"/>
-            <a:ext cx="6026009" cy="1200329"/>
+            <a:off x="152400" y="228600"/>
+            <a:ext cx="6026009" cy="1477328"/>
           </a:xfrm>
           <a:prstGeom prst="rect">
             <a:avLst/>
@@ -16487,6 +16468,12 @@
           <a:p>
             <a:r>
               <a:rPr lang="en-US" dirty="0" smtClean="0"/>
+              <a:t>Testing for random effects in linear models</a:t>
+            </a:r>
+          </a:p>
+          <a:p>
+            <a:r>
+              <a:rPr lang="en-US" dirty="0" smtClean="0"/>
               <a:t>Correlated variables in linear models</a:t>
             </a:r>
           </a:p>
@@ -16513,13 +16500,13 @@
       </p:sp>
       <p:cxnSp>
         <p:nvCxnSpPr>
-          <p:cNvPr id="5" name="Straight Arrow Connector 4"/>
+          <p:cNvPr id="7" name="Straight Arrow Connector 6"/>
           <p:cNvCxnSpPr/>
           <p:nvPr/>
         </p:nvCxnSpPr>
         <p:spPr>
           <a:xfrm rot="10800000">
-            <a:off x="1981200" y="1066800"/>
+            <a:off x="1905000" y="1219200"/>
             <a:ext cx="533400" cy="1588"/>
           </a:xfrm>
           <a:prstGeom prst="straightConnector1">
@@ -19841,11 +19828,7 @@
             </a:r>
             <a:r>
               <a:rPr lang="en-US" dirty="0" err="1" smtClean="0"/>
-              <a:t>Galeck</a:t>
-            </a:r>
-            <a:r>
-              <a:rPr lang="en-US" dirty="0" err="1" smtClean="0"/>
-              <a:t>i</a:t>
+              <a:t>Galecki</a:t>
             </a:r>
             <a:r>
               <a:rPr lang="en-US" dirty="0" smtClean="0"/>
@@ -19855,11 +19838,7 @@
           <a:p>
             <a:r>
               <a:rPr lang="en-US" dirty="0" smtClean="0"/>
-              <a:t>	</a:t>
-            </a:r>
-            <a:r>
-              <a:rPr lang="en-US" dirty="0" smtClean="0"/>
-              <a:t>we are testing that </a:t>
+              <a:t>	we are testing that </a:t>
             </a:r>
             <a:r>
               <a:rPr lang="en-US" dirty="0" smtClean="0">
@@ -19873,7 +19852,40 @@
               <a:rPr lang="en-US" dirty="0" smtClean="0">
                 <a:sym typeface="Symbol"/>
               </a:rPr>
-              <a:t>	</a:t>
+              <a:t>	  may be constrained to never be zero;</a:t>
+            </a:r>
+          </a:p>
+          <a:p>
+            <a:endParaRPr lang="en-US" dirty="0" smtClean="0">
+              <a:sym typeface="Symbol"/>
+            </a:endParaRPr>
+          </a:p>
+          <a:p>
+            <a:r>
+              <a:rPr lang="en-US" dirty="0" smtClean="0">
+                <a:sym typeface="Symbol"/>
+              </a:rPr>
+              <a:t>	our test may be conservative, therefore (p values may be too big)</a:t>
+            </a:r>
+          </a:p>
+          <a:p>
+            <a:endParaRPr lang="en-US" dirty="0" smtClean="0">
+              <a:sym typeface="Symbol"/>
+            </a:endParaRPr>
+          </a:p>
+          <a:p>
+            <a:r>
+              <a:rPr lang="en-US" dirty="0" smtClean="0">
+                <a:sym typeface="Symbol"/>
+              </a:rPr>
+              <a:t>	(see </a:t>
+            </a:r>
+            <a:r>
+              <a:rPr lang="en-US" dirty="0" smtClean="0">
+                <a:sym typeface="Symbol"/>
+                <a:hlinkClick r:id="rId3"/>
+              </a:rPr>
+              <a:t>http://biomet.oxfordjournals.org/content/100/4/1019</a:t>
             </a:r>
             <a:r>
               <a:rPr lang="en-US" dirty="0" smtClean="0">
@@ -19881,95 +19893,22 @@
               </a:rPr>
               <a:t> </a:t>
             </a:r>
+          </a:p>
+          <a:p>
             <a:r>
               <a:rPr lang="en-US" dirty="0" smtClean="0">
                 <a:sym typeface="Symbol"/>
               </a:rPr>
-              <a:t> may be constrained to never be zero;</a:t>
-            </a:r>
-          </a:p>
-          <a:p>
-            <a:endParaRPr lang="en-US" dirty="0" smtClean="0">
-              <a:sym typeface="Symbol"/>
-            </a:endParaRPr>
+              <a:t>“Likelihood ratio tests with boundary constraints using data-dependent degrees of freedom”</a:t>
+            </a:r>
           </a:p>
           <a:p>
             <a:r>
               <a:rPr lang="en-US" dirty="0" smtClean="0">
                 <a:sym typeface="Symbol"/>
               </a:rPr>
-              <a:t>	our test may be conservative, therefore (p values may be too big)</a:t>
-            </a:r>
-          </a:p>
-          <a:p>
-            <a:endParaRPr lang="en-US" dirty="0" smtClean="0">
-              <a:sym typeface="Symbol"/>
-            </a:endParaRPr>
-          </a:p>
-          <a:p>
-            <a:r>
-              <a:rPr lang="en-US" dirty="0" smtClean="0">
-                <a:sym typeface="Symbol"/>
-              </a:rPr>
-              <a:t>	</a:t>
-            </a:r>
-            <a:r>
-              <a:rPr lang="en-US" dirty="0" smtClean="0">
-                <a:sym typeface="Symbol"/>
-              </a:rPr>
-              <a:t>(see </a:t>
-            </a:r>
-            <a:r>
-              <a:rPr lang="en-US" dirty="0" smtClean="0">
-                <a:sym typeface="Symbol"/>
-                <a:hlinkClick r:id="rId3"/>
-              </a:rPr>
-              <a:t>http://</a:t>
-            </a:r>
-            <a:r>
-              <a:rPr lang="en-US" dirty="0" smtClean="0">
-                <a:sym typeface="Symbol"/>
-                <a:hlinkClick r:id="rId3"/>
-              </a:rPr>
-              <a:t>biomet.oxfordjournals.org/content/100/4/1019</a:t>
-            </a:r>
-            <a:r>
-              <a:rPr lang="en-US" dirty="0" smtClean="0">
-                <a:sym typeface="Symbol"/>
-              </a:rPr>
-              <a:t> </a:t>
-            </a:r>
-          </a:p>
-          <a:p>
-            <a:r>
-              <a:rPr lang="en-US" dirty="0" smtClean="0">
-                <a:sym typeface="Symbol"/>
-              </a:rPr>
-              <a:t>“Likelihood ratio tests with boundary constraints using data-dependent degrees of </a:t>
-            </a:r>
-            <a:r>
-              <a:rPr lang="en-US" dirty="0" smtClean="0">
-                <a:sym typeface="Symbol"/>
-              </a:rPr>
-              <a:t>freedom”</a:t>
-            </a:r>
-          </a:p>
-          <a:p>
-            <a:r>
-              <a:rPr lang="en-US" dirty="0" smtClean="0">
-                <a:sym typeface="Symbol"/>
-              </a:rPr>
-              <a:t>	</a:t>
-            </a:r>
-            <a:r>
-              <a:rPr lang="en-US" dirty="0" smtClean="0">
-                <a:sym typeface="Symbol"/>
-              </a:rPr>
-              <a:t>for more information)</a:t>
-            </a:r>
-            <a:endParaRPr lang="en-US" dirty="0" smtClean="0">
-              <a:sym typeface="Symbol"/>
-            </a:endParaRPr>
+              <a:t>	for more information)</a:t>
+            </a:r>
           </a:p>
           <a:p>
             <a:endParaRPr lang="en-US" dirty="0"/>
@@ -23150,14 +23089,14 @@
       </p:grpSpPr>
       <p:sp>
         <p:nvSpPr>
-          <p:cNvPr id="4" name="TextBox 3"/>
+          <p:cNvPr id="6" name="TextBox 5"/>
           <p:cNvSpPr txBox="1"/>
           <p:nvPr/>
         </p:nvSpPr>
         <p:spPr>
           <a:xfrm>
-            <a:off x="304800" y="247471"/>
-            <a:ext cx="6026009" cy="1200329"/>
+            <a:off x="152400" y="228600"/>
+            <a:ext cx="6026009" cy="1477328"/>
           </a:xfrm>
           <a:prstGeom prst="rect">
             <a:avLst/>
@@ -23172,6 +23111,12 @@
           <a:p>
             <a:r>
               <a:rPr lang="en-US" dirty="0" smtClean="0"/>
+              <a:t>Testing for random effects in linear models</a:t>
+            </a:r>
+          </a:p>
+          <a:p>
+            <a:r>
+              <a:rPr lang="en-US" dirty="0" smtClean="0"/>
               <a:t>Correlated variables in linear models</a:t>
             </a:r>
           </a:p>
@@ -23198,13 +23143,13 @@
       </p:sp>
       <p:cxnSp>
         <p:nvCxnSpPr>
-          <p:cNvPr id="5" name="Straight Arrow Connector 4"/>
+          <p:cNvPr id="7" name="Straight Arrow Connector 6"/>
           <p:cNvCxnSpPr/>
           <p:nvPr/>
         </p:nvCxnSpPr>
         <p:spPr>
           <a:xfrm rot="10800000">
-            <a:off x="3886200" y="399871"/>
+            <a:off x="3733800" y="684211"/>
             <a:ext cx="533400" cy="1588"/>
           </a:xfrm>
           <a:prstGeom prst="straightConnector1">
@@ -23278,23 +23223,7 @@
           <a:p>
             <a:r>
               <a:rPr lang="en-US" dirty="0" smtClean="0"/>
-              <a:t>We will use a dataset from the </a:t>
-            </a:r>
-            <a:r>
-              <a:rPr lang="en-US" dirty="0" smtClean="0"/>
-              <a:t>Galapagos </a:t>
-            </a:r>
-            <a:r>
-              <a:rPr lang="en-US" dirty="0" smtClean="0"/>
-              <a:t>islands  to think about </a:t>
-            </a:r>
-            <a:r>
-              <a:rPr lang="en-US" dirty="0" smtClean="0"/>
-              <a:t>correlated </a:t>
-            </a:r>
-            <a:r>
-              <a:rPr lang="en-US" dirty="0" smtClean="0"/>
-              <a:t>independent variables</a:t>
+              <a:t>We will use a dataset from the Galapagos islands  to think about correlated independent variables</a:t>
             </a:r>
             <a:endParaRPr lang="en-US" dirty="0"/>
           </a:p>

</xml_diff>